<commit_message>
REPORTGEN-870: update chinese library reports
</commit_message>
<xml_diff>
--- a/CastReporting.Reporting.Core/Templates/zh-CN/Portfolio/Portfolio component library/1- Portfolio-Powerpoint-components-library.pptx
+++ b/CastReporting.Reporting.Core/Templates/zh-CN/Portfolio/Portfolio component library/1- Portfolio-Powerpoint-components-library.pptx
@@ -10,7 +10,7 @@
     <p:sldMasterId id="2147483713" r:id="rId6"/>
   </p:sldMasterIdLst>
   <p:notesMasterIdLst>
-    <p:notesMasterId r:id="rId32"/>
+    <p:notesMasterId r:id="rId33"/>
   </p:notesMasterIdLst>
   <p:sldIdLst>
     <p:sldId id="262" r:id="rId7"/>
@@ -36,8 +36,9 @@
     <p:sldId id="332" r:id="rId27"/>
     <p:sldId id="303" r:id="rId28"/>
     <p:sldId id="335" r:id="rId29"/>
-    <p:sldId id="333" r:id="rId30"/>
-    <p:sldId id="318" r:id="rId31"/>
+    <p:sldId id="337" r:id="rId30"/>
+    <p:sldId id="333" r:id="rId31"/>
+    <p:sldId id="318" r:id="rId32"/>
   </p:sldIdLst>
   <p:sldSz cx="9144000" cy="6858000" type="screen4x3"/>
   <p:notesSz cx="6858000" cy="9144000"/>
@@ -2180,7 +2181,7 @@
           <a:p>
             <a:fld id="{268042A1-6D91-4513-A62D-1E3FD70C84BE}" type="datetimeFigureOut">
               <a:rPr lang="fr-FR" smtClean="0"/>
-              <a:t>09/04/2019</a:t>
+              <a:t>24/03/2020</a:t>
             </a:fld>
             <a:endParaRPr lang="fr-FR"/>
           </a:p>
@@ -2778,7 +2779,7 @@
             <a:fld id="{D8E3BBD6-5DF7-411E-B793-6A3558CCCDCA}" type="datetimeFigureOut">
               <a:rPr lang="fr-FR" smtClean="0"/>
               <a:pPr/>
-              <a:t>09/04/2019</a:t>
+              <a:t>24/03/2020</a:t>
             </a:fld>
             <a:endParaRPr lang="fr-FR" dirty="0"/>
           </a:p>
@@ -2941,7 +2942,7 @@
             <a:fld id="{D8E3BBD6-5DF7-411E-B793-6A3558CCCDCA}" type="datetimeFigureOut">
               <a:rPr lang="fr-FR" smtClean="0"/>
               <a:pPr/>
-              <a:t>09/04/2019</a:t>
+              <a:t>24/03/2020</a:t>
             </a:fld>
             <a:endParaRPr lang="fr-FR" dirty="0"/>
           </a:p>
@@ -4446,7 +4447,7 @@
             <a:fld id="{D8E3BBD6-5DF7-411E-B793-6A3558CCCDCA}" type="datetimeFigureOut">
               <a:rPr lang="fr-FR" smtClean="0"/>
               <a:pPr/>
-              <a:t>09/04/2019</a:t>
+              <a:t>24/03/2020</a:t>
             </a:fld>
             <a:endParaRPr lang="fr-FR" dirty="0"/>
           </a:p>
@@ -6806,7 +6807,7 @@
             <a:fld id="{D8E3BBD6-5DF7-411E-B793-6A3558CCCDCA}" type="datetimeFigureOut">
               <a:rPr lang="fr-FR" smtClean="0"/>
               <a:pPr/>
-              <a:t>09/04/2019</a:t>
+              <a:t>24/03/2020</a:t>
             </a:fld>
             <a:endParaRPr lang="fr-FR" dirty="0"/>
           </a:p>
@@ -9432,7 +9433,7 @@
             <a:fld id="{D8E3BBD6-5DF7-411E-B793-6A3558CCCDCA}" type="datetimeFigureOut">
               <a:rPr lang="fr-FR" smtClean="0"/>
               <a:pPr/>
-              <a:t>09/04/2019</a:t>
+              <a:t>24/03/2020</a:t>
             </a:fld>
             <a:endParaRPr lang="fr-FR" dirty="0"/>
           </a:p>
@@ -12341,7 +12342,7 @@
             <a:fld id="{D8E3BBD6-5DF7-411E-B793-6A3558CCCDCA}" type="datetimeFigureOut">
               <a:rPr lang="fr-FR" smtClean="0"/>
               <a:pPr/>
-              <a:t>09/04/2019</a:t>
+              <a:t>24/03/2020</a:t>
             </a:fld>
             <a:endParaRPr lang="fr-FR" dirty="0"/>
           </a:p>
@@ -14125,7 +14126,7 @@
             <a:fld id="{D8E3BBD6-5DF7-411E-B793-6A3558CCCDCA}" type="datetimeFigureOut">
               <a:rPr lang="fr-FR" smtClean="0"/>
               <a:pPr/>
-              <a:t>09/04/2019</a:t>
+              <a:t>24/03/2020</a:t>
             </a:fld>
             <a:endParaRPr lang="fr-FR" dirty="0"/>
           </a:p>
@@ -14205,7 +14206,7 @@
             <a:fld id="{D8E3BBD6-5DF7-411E-B793-6A3558CCCDCA}" type="datetimeFigureOut">
               <a:rPr lang="fr-FR" smtClean="0"/>
               <a:pPr/>
-              <a:t>09/04/2019</a:t>
+              <a:t>24/03/2020</a:t>
             </a:fld>
             <a:endParaRPr lang="fr-FR" dirty="0"/>
           </a:p>
@@ -14465,7 +14466,7 @@
             <a:fld id="{D8E3BBD6-5DF7-411E-B793-6A3558CCCDCA}" type="datetimeFigureOut">
               <a:rPr lang="fr-FR" smtClean="0"/>
               <a:pPr/>
-              <a:t>09/04/2019</a:t>
+              <a:t>24/03/2020</a:t>
             </a:fld>
             <a:endParaRPr lang="fr-FR" dirty="0"/>
           </a:p>
@@ -14707,7 +14708,7 @@
             <a:fld id="{D8E3BBD6-5DF7-411E-B793-6A3558CCCDCA}" type="datetimeFigureOut">
               <a:rPr lang="fr-FR" smtClean="0"/>
               <a:pPr/>
-              <a:t>09/04/2019</a:t>
+              <a:t>24/03/2020</a:t>
             </a:fld>
             <a:endParaRPr lang="fr-FR" dirty="0"/>
           </a:p>
@@ -14909,7 +14910,7 @@
             <a:fld id="{D8E3BBD6-5DF7-411E-B793-6A3558CCCDCA}" type="datetimeFigureOut">
               <a:rPr lang="fr-FR" smtClean="0"/>
               <a:pPr/>
-              <a:t>09/04/2019</a:t>
+              <a:t>24/03/2020</a:t>
             </a:fld>
             <a:endParaRPr lang="fr-FR" dirty="0"/>
           </a:p>
@@ -26636,14 +26637,14 @@
       </p:sp>
       <p:graphicFrame>
         <p:nvGraphicFramePr>
-          <p:cNvPr id="10" name="Table 9" descr="TABLE;PF_BC_RELEASE_PERFORMANCE;BF=2.90 2.90 2.90 2.90 2.90 2.90 2.90 2.90;SLA=2 5"/>
+          <p:cNvPr id="10" name="Table 9" descr="TABLE;PF_BC_RELEASE_PERFORMANCE;BF=2.90 2.90 2.90 2.90 2.90 2.90 2.90 2.90,SLA=2 5"/>
           <p:cNvGraphicFramePr>
             <a:graphicFrameLocks noGrp="1"/>
           </p:cNvGraphicFramePr>
           <p:nvPr>
             <p:extLst>
               <p:ext uri="{D42A27DB-BD31-4B8C-83A1-F6EECF244321}">
-                <p14:modId xmlns:p14="http://schemas.microsoft.com/office/powerpoint/2010/main" val="1441438410"/>
+                <p14:modId xmlns:p14="http://schemas.microsoft.com/office/powerpoint/2010/main" val="3212611895"/>
               </p:ext>
             </p:extLst>
           </p:nvPr>
@@ -28591,7 +28592,7 @@
         </p:nvSpPr>
         <p:spPr>
           <a:xfrm>
-            <a:off x="395536" y="1218238"/>
+            <a:off x="395536" y="1434262"/>
             <a:ext cx="8143200" cy="338554"/>
           </a:xfrm>
           <a:prstGeom prst="rect">
@@ -28635,7 +28636,7 @@
         <p:spPr>
           <a:xfrm>
             <a:off x="2051720" y="724634"/>
-            <a:ext cx="6630534" cy="369332"/>
+            <a:ext cx="6630534" cy="646331"/>
           </a:xfrm>
           <a:prstGeom prst="rect">
             <a:avLst/>
@@ -28661,7 +28662,7 @@
           <a:p>
             <a:r>
               <a:rPr lang="en-US" sz="1800" dirty="0"/>
-              <a:t>PF_BC_RELEASE_PERFORMANCE</a:t>
+              <a:t>PF_BC_RELEASE_PERFORMANCE &amp; PF_TABLE_RELEASE_PERFORMANCE</a:t>
             </a:r>
           </a:p>
         </p:txBody>
@@ -28746,6 +28747,1616 @@
 </file>
 
 <file path=ppt/slides/slide24.xml><?xml version="1.0" encoding="utf-8"?>
+<p:sld xmlns:a="http://schemas.openxmlformats.org/drawingml/2006/main" xmlns:r="http://schemas.openxmlformats.org/officeDocument/2006/relationships" xmlns:p="http://schemas.openxmlformats.org/presentationml/2006/main">
+  <p:cSld>
+    <p:spTree>
+      <p:nvGrpSpPr>
+        <p:cNvPr id="1" name=""/>
+        <p:cNvGrpSpPr/>
+        <p:nvPr/>
+      </p:nvGrpSpPr>
+      <p:grpSpPr>
+        <a:xfrm>
+          <a:off x="0" y="0"/>
+          <a:ext cx="0" cy="0"/>
+          <a:chOff x="0" y="0"/>
+          <a:chExt cx="0" cy="0"/>
+        </a:xfrm>
+      </p:grpSpPr>
+      <p:sp>
+        <p:nvSpPr>
+          <p:cNvPr id="24" name="Title 1"/>
+          <p:cNvSpPr>
+            <a:spLocks noGrp="1"/>
+          </p:cNvSpPr>
+          <p:nvPr>
+            <p:ph type="title"/>
+          </p:nvPr>
+        </p:nvSpPr>
+        <p:spPr/>
+        <p:txBody>
+          <a:bodyPr>
+            <a:normAutofit/>
+          </a:bodyPr>
+          <a:lstStyle/>
+          <a:p>
+            <a:r>
+              <a:rPr lang="en-US" dirty="0"/>
+              <a:t>PowerPoint Templates – Tables</a:t>
+            </a:r>
+          </a:p>
+        </p:txBody>
+      </p:sp>
+      <p:sp>
+        <p:nvSpPr>
+          <p:cNvPr id="12" name="Rounded Rectangle 11"/>
+          <p:cNvSpPr/>
+          <p:nvPr/>
+        </p:nvSpPr>
+        <p:spPr>
+          <a:xfrm>
+            <a:off x="459645" y="908720"/>
+            <a:ext cx="8267157" cy="5688632"/>
+          </a:xfrm>
+          <a:prstGeom prst="roundRect">
+            <a:avLst>
+              <a:gd name="adj" fmla="val 2663"/>
+            </a:avLst>
+          </a:prstGeom>
+          <a:solidFill>
+            <a:schemeClr val="bg1">
+              <a:lumMod val="95000"/>
+            </a:schemeClr>
+          </a:solidFill>
+          <a:ln>
+            <a:noFill/>
+          </a:ln>
+          <a:effectLst/>
+        </p:spPr>
+        <p:style>
+          <a:lnRef idx="1">
+            <a:schemeClr val="accent5"/>
+          </a:lnRef>
+          <a:fillRef idx="3">
+            <a:schemeClr val="accent5"/>
+          </a:fillRef>
+          <a:effectRef idx="2">
+            <a:schemeClr val="accent5"/>
+          </a:effectRef>
+          <a:fontRef idx="minor">
+            <a:schemeClr val="lt1"/>
+          </a:fontRef>
+        </p:style>
+        <p:txBody>
+          <a:bodyPr rtlCol="0" anchor="ctr"/>
+          <a:lstStyle/>
+          <a:p>
+            <a:pPr algn="ctr"/>
+            <a:endParaRPr lang="en-US" dirty="0">
+              <a:solidFill>
+                <a:schemeClr val="lt1"/>
+              </a:solidFill>
+            </a:endParaRPr>
+          </a:p>
+        </p:txBody>
+      </p:sp>
+      <p:sp>
+        <p:nvSpPr>
+          <p:cNvPr id="13" name="TextBox 12"/>
+          <p:cNvSpPr txBox="1"/>
+          <p:nvPr/>
+        </p:nvSpPr>
+        <p:spPr>
+          <a:xfrm>
+            <a:off x="395536" y="908720"/>
+            <a:ext cx="8143200" cy="400110"/>
+          </a:xfrm>
+          <a:prstGeom prst="rect">
+            <a:avLst/>
+          </a:prstGeom>
+          <a:noFill/>
+        </p:spPr>
+        <p:txBody>
+          <a:bodyPr wrap="square" lIns="180000" rIns="180000" rtlCol="0">
+            <a:spAutoFit/>
+          </a:bodyPr>
+          <a:lstStyle>
+            <a:defPPr>
+              <a:defRPr lang="fr-FR"/>
+            </a:defPPr>
+            <a:lvl1pPr>
+              <a:defRPr sz="2000" b="1">
+                <a:solidFill>
+                  <a:schemeClr val="tx1">
+                    <a:lumMod val="75000"/>
+                    <a:lumOff val="25000"/>
+                  </a:schemeClr>
+                </a:solidFill>
+              </a:defRPr>
+            </a:lvl1pPr>
+          </a:lstStyle>
+          <a:p>
+            <a:r>
+              <a:rPr lang="en-US" dirty="0"/>
+              <a:t>Generic SLA View</a:t>
+            </a:r>
+          </a:p>
+        </p:txBody>
+      </p:sp>
+      <p:sp>
+        <p:nvSpPr>
+          <p:cNvPr id="14" name="TextBox 13"/>
+          <p:cNvSpPr txBox="1"/>
+          <p:nvPr/>
+        </p:nvSpPr>
+        <p:spPr>
+          <a:xfrm>
+            <a:off x="1979712" y="1268760"/>
+            <a:ext cx="6630534" cy="369332"/>
+          </a:xfrm>
+          <a:prstGeom prst="rect">
+            <a:avLst/>
+          </a:prstGeom>
+          <a:noFill/>
+        </p:spPr>
+        <p:txBody>
+          <a:bodyPr wrap="square" rtlCol="0">
+            <a:spAutoFit/>
+          </a:bodyPr>
+          <a:lstStyle>
+            <a:defPPr>
+              <a:defRPr lang="fr-FR"/>
+            </a:defPPr>
+            <a:lvl1pPr>
+              <a:defRPr sz="2000" b="1">
+                <a:solidFill>
+                  <a:srgbClr val="5E5E5E"/>
+                </a:solidFill>
+              </a:defRPr>
+            </a:lvl1pPr>
+          </a:lstStyle>
+          <a:p>
+            <a:r>
+              <a:rPr lang="en-US" sz="1800" dirty="0"/>
+              <a:t>PF_TABLE_RELEASE_PERFORMANCE</a:t>
+            </a:r>
+          </a:p>
+        </p:txBody>
+      </p:sp>
+      <p:sp>
+        <p:nvSpPr>
+          <p:cNvPr id="15" name="TextBox 14"/>
+          <p:cNvSpPr txBox="1"/>
+          <p:nvPr/>
+        </p:nvSpPr>
+        <p:spPr>
+          <a:xfrm>
+            <a:off x="395536" y="1268760"/>
+            <a:ext cx="1709122" cy="400110"/>
+          </a:xfrm>
+          <a:prstGeom prst="rect">
+            <a:avLst/>
+          </a:prstGeom>
+          <a:noFill/>
+        </p:spPr>
+        <p:txBody>
+          <a:bodyPr wrap="none" rtlCol="0">
+            <a:spAutoFit/>
+          </a:bodyPr>
+          <a:lstStyle>
+            <a:defPPr>
+              <a:defRPr lang="fr-FR"/>
+            </a:defPPr>
+            <a:lvl1pPr algn="r">
+              <a:defRPr sz="2000">
+                <a:solidFill>
+                  <a:schemeClr val="bg1">
+                    <a:lumMod val="50000"/>
+                  </a:schemeClr>
+                </a:solidFill>
+              </a:defRPr>
+            </a:lvl1pPr>
+          </a:lstStyle>
+          <a:p>
+            <a:r>
+              <a:rPr lang="en-US" dirty="0"/>
+              <a:t>Block Name :</a:t>
+            </a:r>
+          </a:p>
+        </p:txBody>
+      </p:sp>
+      <p:sp>
+        <p:nvSpPr>
+          <p:cNvPr id="16" name="TextBox 15"/>
+          <p:cNvSpPr txBox="1"/>
+          <p:nvPr/>
+        </p:nvSpPr>
+        <p:spPr>
+          <a:xfrm>
+            <a:off x="1991587" y="1671191"/>
+            <a:ext cx="6630534" cy="1015663"/>
+          </a:xfrm>
+          <a:prstGeom prst="rect">
+            <a:avLst/>
+          </a:prstGeom>
+          <a:noFill/>
+        </p:spPr>
+        <p:txBody>
+          <a:bodyPr wrap="square" rtlCol="0">
+            <a:spAutoFit/>
+          </a:bodyPr>
+          <a:lstStyle>
+            <a:defPPr>
+              <a:defRPr lang="fr-FR"/>
+            </a:defPPr>
+            <a:lvl1pPr>
+              <a:defRPr sz="1600" i="1">
+                <a:solidFill>
+                  <a:schemeClr val="bg1">
+                    <a:lumMod val="50000"/>
+                  </a:schemeClr>
+                </a:solidFill>
+              </a:defRPr>
+            </a:lvl1pPr>
+          </a:lstStyle>
+          <a:p>
+            <a:r>
+              <a:rPr lang="en-US" sz="1200" dirty="0"/>
+              <a:t>ID=ID1|ID2|ID3… where </a:t>
+            </a:r>
+            <a:r>
+              <a:rPr lang="en-US" sz="1200" dirty="0" err="1"/>
+              <a:t>Idx</a:t>
+            </a:r>
+            <a:r>
+              <a:rPr lang="en-US" sz="1200" dirty="0"/>
+              <a:t> is the metric id of the quality indicator (BC, TC or QR) to assess</a:t>
+            </a:r>
+          </a:p>
+          <a:p>
+            <a:r>
+              <a:rPr lang="en-US" sz="1200" dirty="0"/>
+              <a:t>TARGETS=T1|T2|T3… where Tx is a target to fix regarding each line, if only one target, it will be used for all metrics</a:t>
+            </a:r>
+          </a:p>
+          <a:p>
+            <a:r>
+              <a:rPr lang="en-US" sz="1200" dirty="0"/>
+              <a:t>SLA=X|Y where X is corresponding to the a% and Y is corresponding to the b% in the formula below </a:t>
+            </a:r>
+          </a:p>
+        </p:txBody>
+      </p:sp>
+      <p:sp>
+        <p:nvSpPr>
+          <p:cNvPr id="17" name="TextBox 16"/>
+          <p:cNvSpPr txBox="1"/>
+          <p:nvPr/>
+        </p:nvSpPr>
+        <p:spPr>
+          <a:xfrm>
+            <a:off x="895673" y="1588730"/>
+            <a:ext cx="1208985" cy="400110"/>
+          </a:xfrm>
+          <a:prstGeom prst="rect">
+            <a:avLst/>
+          </a:prstGeom>
+          <a:noFill/>
+        </p:spPr>
+        <p:txBody>
+          <a:bodyPr wrap="none" rtlCol="0">
+            <a:spAutoFit/>
+          </a:bodyPr>
+          <a:lstStyle>
+            <a:defPPr>
+              <a:defRPr lang="fr-FR"/>
+            </a:defPPr>
+            <a:lvl1pPr algn="r">
+              <a:defRPr sz="2000">
+                <a:solidFill>
+                  <a:schemeClr val="bg1">
+                    <a:lumMod val="50000"/>
+                  </a:schemeClr>
+                </a:solidFill>
+              </a:defRPr>
+            </a:lvl1pPr>
+          </a:lstStyle>
+          <a:p>
+            <a:r>
+              <a:rPr lang="en-US" dirty="0"/>
+              <a:t>Options :</a:t>
+            </a:r>
+          </a:p>
+        </p:txBody>
+      </p:sp>
+      <p:graphicFrame>
+        <p:nvGraphicFramePr>
+          <p:cNvPr id="10" name="Table 9" descr="TABLE;PF_TABLE_RELEASE_PERFORMANCE;ID=60017|66068|4554|7780,TARGETS=3.00,SLA=2|5"/>
+          <p:cNvGraphicFramePr>
+            <a:graphicFrameLocks noGrp="1"/>
+          </p:cNvGraphicFramePr>
+          <p:nvPr>
+            <p:extLst>
+              <p:ext uri="{D42A27DB-BD31-4B8C-83A1-F6EECF244321}">
+                <p14:modId xmlns:p14="http://schemas.microsoft.com/office/powerpoint/2010/main" val="4280737692"/>
+              </p:ext>
+            </p:extLst>
+          </p:nvPr>
+        </p:nvGraphicFramePr>
+        <p:xfrm>
+          <a:off x="755576" y="4550803"/>
+          <a:ext cx="7783158" cy="1783352"/>
+        </p:xfrm>
+        <a:graphic>
+          <a:graphicData uri="http://schemas.openxmlformats.org/drawingml/2006/table">
+            <a:tbl>
+              <a:tblPr firstCol="1" bandRow="1">
+                <a:tableStyleId>{6E25E649-3F16-4E02-A733-19D2CDBF48F0}</a:tableStyleId>
+              </a:tblPr>
+              <a:tblGrid>
+                <a:gridCol w="2993522">
+                  <a:extLst>
+                    <a:ext uri="{9D8B030D-6E8A-4147-A177-3AD203B41FA5}">
+                      <a16:colId xmlns:a16="http://schemas.microsoft.com/office/drawing/2014/main" val="20000"/>
+                    </a:ext>
+                  </a:extLst>
+                </a:gridCol>
+                <a:gridCol w="1372640">
+                  <a:extLst>
+                    <a:ext uri="{9D8B030D-6E8A-4147-A177-3AD203B41FA5}">
+                      <a16:colId xmlns:a16="http://schemas.microsoft.com/office/drawing/2014/main" val="20001"/>
+                    </a:ext>
+                  </a:extLst>
+                </a:gridCol>
+                <a:gridCol w="1138998">
+                  <a:extLst>
+                    <a:ext uri="{9D8B030D-6E8A-4147-A177-3AD203B41FA5}">
+                      <a16:colId xmlns:a16="http://schemas.microsoft.com/office/drawing/2014/main" val="20002"/>
+                    </a:ext>
+                  </a:extLst>
+                </a:gridCol>
+                <a:gridCol w="949165">
+                  <a:extLst>
+                    <a:ext uri="{9D8B030D-6E8A-4147-A177-3AD203B41FA5}">
+                      <a16:colId xmlns:a16="http://schemas.microsoft.com/office/drawing/2014/main" val="20003"/>
+                    </a:ext>
+                  </a:extLst>
+                </a:gridCol>
+                <a:gridCol w="1328833">
+                  <a:extLst>
+                    <a:ext uri="{9D8B030D-6E8A-4147-A177-3AD203B41FA5}">
+                      <a16:colId xmlns:a16="http://schemas.microsoft.com/office/drawing/2014/main" val="20004"/>
+                    </a:ext>
+                  </a:extLst>
+                </a:gridCol>
+              </a:tblGrid>
+              <a:tr h="483514">
+                <a:tc>
+                  <a:txBody>
+                    <a:bodyPr/>
+                    <a:lstStyle/>
+                    <a:p>
+                      <a:pPr>
+                        <a:lnSpc>
+                          <a:spcPct val="115000"/>
+                        </a:lnSpc>
+                        <a:spcAft>
+                          <a:spcPts val="0"/>
+                        </a:spcAft>
+                      </a:pPr>
+                      <a:r>
+                        <a:rPr lang="en-US" sz="1100" dirty="0">
+                          <a:effectLst/>
+                        </a:rPr>
+                        <a:t>Application Quality Measure</a:t>
+                      </a:r>
+                      <a:endParaRPr lang="en-IN" sz="1100" dirty="0">
+                        <a:solidFill>
+                          <a:srgbClr val="365F91"/>
+                        </a:solidFill>
+                        <a:effectLst/>
+                        <a:latin typeface="Calibri"/>
+                        <a:ea typeface="Calibri"/>
+                        <a:cs typeface="Times New Roman"/>
+                      </a:endParaRPr>
+                    </a:p>
+                  </a:txBody>
+                  <a:tcPr marL="68580" marR="68580" marT="0" marB="0" anchor="ctr"/>
+                </a:tc>
+                <a:tc>
+                  <a:txBody>
+                    <a:bodyPr/>
+                    <a:lstStyle/>
+                    <a:p>
+                      <a:pPr algn="ctr">
+                        <a:lnSpc>
+                          <a:spcPct val="115000"/>
+                        </a:lnSpc>
+                        <a:spcAft>
+                          <a:spcPts val="0"/>
+                        </a:spcAft>
+                      </a:pPr>
+                      <a:r>
+                        <a:rPr lang="en-US" sz="1100" kern="1200" dirty="0">
+                          <a:solidFill>
+                            <a:schemeClr val="dk1"/>
+                          </a:solidFill>
+                          <a:effectLst/>
+                          <a:latin typeface="+mn-lt"/>
+                          <a:ea typeface="+mn-ea"/>
+                          <a:cs typeface="+mn-cs"/>
+                        </a:rPr>
+                        <a:t>Previous quarter</a:t>
+                      </a:r>
+                      <a:endParaRPr lang="en-IN" sz="1100" kern="1200" dirty="0">
+                        <a:solidFill>
+                          <a:schemeClr val="dk1"/>
+                        </a:solidFill>
+                        <a:effectLst/>
+                        <a:latin typeface="+mn-lt"/>
+                        <a:ea typeface="+mn-ea"/>
+                        <a:cs typeface="+mn-cs"/>
+                      </a:endParaRPr>
+                    </a:p>
+                  </a:txBody>
+                  <a:tcPr marL="68580" marR="68580" marT="0" marB="0" anchor="ctr"/>
+                </a:tc>
+                <a:tc>
+                  <a:txBody>
+                    <a:bodyPr/>
+                    <a:lstStyle/>
+                    <a:p>
+                      <a:pPr algn="ctr">
+                        <a:lnSpc>
+                          <a:spcPct val="115000"/>
+                        </a:lnSpc>
+                        <a:spcAft>
+                          <a:spcPts val="0"/>
+                        </a:spcAft>
+                      </a:pPr>
+                      <a:r>
+                        <a:rPr lang="en-US" sz="1100" kern="1200" dirty="0">
+                          <a:effectLst/>
+                        </a:rPr>
+                        <a:t>Target</a:t>
+                      </a:r>
+                      <a:r>
+                        <a:rPr lang="en-US" sz="1100" kern="1200" baseline="0" dirty="0">
+                          <a:effectLst/>
+                        </a:rPr>
+                        <a:t> s</a:t>
+                      </a:r>
+                      <a:r>
+                        <a:rPr lang="en-US" sz="1100" kern="1200" dirty="0">
+                          <a:effectLst/>
+                        </a:rPr>
+                        <a:t>core</a:t>
+                      </a:r>
+                      <a:endParaRPr lang="en-IN" sz="1100" kern="1200" dirty="0">
+                        <a:solidFill>
+                          <a:schemeClr val="dk1"/>
+                        </a:solidFill>
+                        <a:effectLst/>
+                        <a:latin typeface="+mn-lt"/>
+                        <a:ea typeface="+mn-ea"/>
+                        <a:cs typeface="+mn-cs"/>
+                      </a:endParaRPr>
+                    </a:p>
+                  </a:txBody>
+                  <a:tcPr marL="68580" marR="68580" marT="0" marB="0" anchor="ctr"/>
+                </a:tc>
+                <a:tc>
+                  <a:txBody>
+                    <a:bodyPr/>
+                    <a:lstStyle/>
+                    <a:p>
+                      <a:pPr algn="ctr">
+                        <a:lnSpc>
+                          <a:spcPct val="115000"/>
+                        </a:lnSpc>
+                        <a:spcAft>
+                          <a:spcPts val="0"/>
+                        </a:spcAft>
+                      </a:pPr>
+                      <a:r>
+                        <a:rPr lang="en-US" sz="1100" dirty="0">
+                          <a:effectLst/>
+                        </a:rPr>
+                        <a:t>Actual score</a:t>
+                      </a:r>
+                    </a:p>
+                  </a:txBody>
+                  <a:tcPr marL="68580" marR="68580" marT="0" marB="0" anchor="ctr"/>
+                </a:tc>
+                <a:tc>
+                  <a:txBody>
+                    <a:bodyPr/>
+                    <a:lstStyle/>
+                    <a:p>
+                      <a:pPr algn="ctr">
+                        <a:lnSpc>
+                          <a:spcPct val="115000"/>
+                        </a:lnSpc>
+                        <a:spcAft>
+                          <a:spcPts val="0"/>
+                        </a:spcAft>
+                      </a:pPr>
+                      <a:r>
+                        <a:rPr lang="en-US" sz="1100" dirty="0">
+                          <a:effectLst/>
+                        </a:rPr>
+                        <a:t>SLA Assessment</a:t>
+                      </a:r>
+                    </a:p>
+                  </a:txBody>
+                  <a:tcPr marL="68580" marR="68580" marT="0" marB="0" anchor="ctr"/>
+                </a:tc>
+                <a:extLst>
+                  <a:ext uri="{0D108BD9-81ED-4DB2-BD59-A6C34878D82A}">
+                    <a16:rowId xmlns:a16="http://schemas.microsoft.com/office/drawing/2014/main" val="10000"/>
+                  </a:ext>
+                </a:extLst>
+              </a:tr>
+              <a:tr h="276729">
+                <a:tc>
+                  <a:txBody>
+                    <a:bodyPr/>
+                    <a:lstStyle/>
+                    <a:p>
+                      <a:pPr marL="0" marR="0" lvl="0" indent="0" algn="l" defTabSz="914400" rtl="0" eaLnBrk="1" fontAlgn="auto" latinLnBrk="0" hangingPunct="1">
+                        <a:lnSpc>
+                          <a:spcPct val="115000"/>
+                        </a:lnSpc>
+                        <a:spcBef>
+                          <a:spcPts val="0"/>
+                        </a:spcBef>
+                        <a:spcAft>
+                          <a:spcPts val="0"/>
+                        </a:spcAft>
+                        <a:buClrTx/>
+                        <a:buSzTx/>
+                        <a:buFontTx/>
+                        <a:buNone/>
+                        <a:tabLst/>
+                        <a:defRPr/>
+                      </a:pPr>
+                      <a:r>
+                        <a:rPr lang="en-US" sz="1100" dirty="0">
+                          <a:effectLst/>
+                        </a:rPr>
+                        <a:t>Total Quality Index</a:t>
+                      </a:r>
+                      <a:endParaRPr lang="en-IN" sz="1100" dirty="0">
+                        <a:solidFill>
+                          <a:srgbClr val="365F91"/>
+                        </a:solidFill>
+                        <a:effectLst/>
+                        <a:latin typeface="Calibri"/>
+                        <a:ea typeface="Calibri"/>
+                        <a:cs typeface="Times New Roman"/>
+                      </a:endParaRPr>
+                    </a:p>
+                  </a:txBody>
+                  <a:tcPr marL="68580" marR="68580" marT="0" marB="0" anchor="ctr"/>
+                </a:tc>
+                <a:tc>
+                  <a:txBody>
+                    <a:bodyPr/>
+                    <a:lstStyle/>
+                    <a:p>
+                      <a:pPr algn="ctr">
+                        <a:lnSpc>
+                          <a:spcPct val="115000"/>
+                        </a:lnSpc>
+                        <a:spcAft>
+                          <a:spcPts val="0"/>
+                        </a:spcAft>
+                      </a:pPr>
+                      <a:r>
+                        <a:rPr lang="fr-FR" sz="1100" kern="1200" dirty="0"/>
+                        <a:t>0.00</a:t>
+                      </a:r>
+                      <a:endParaRPr lang="en-IN" sz="1100" dirty="0">
+                        <a:solidFill>
+                          <a:srgbClr val="365F91"/>
+                        </a:solidFill>
+                        <a:effectLst/>
+                        <a:latin typeface="Calibri"/>
+                        <a:ea typeface="Calibri"/>
+                        <a:cs typeface="Times New Roman"/>
+                      </a:endParaRPr>
+                    </a:p>
+                  </a:txBody>
+                  <a:tcPr marL="68580" marR="68580" marT="0" marB="0" anchor="ctr"/>
+                </a:tc>
+                <a:tc>
+                  <a:txBody>
+                    <a:bodyPr/>
+                    <a:lstStyle/>
+                    <a:p>
+                      <a:pPr marL="0" marR="0" indent="0" algn="ctr" defTabSz="914400" rtl="0" eaLnBrk="1" fontAlgn="auto" latinLnBrk="0" hangingPunct="1">
+                        <a:lnSpc>
+                          <a:spcPct val="115000"/>
+                        </a:lnSpc>
+                        <a:spcBef>
+                          <a:spcPts val="0"/>
+                        </a:spcBef>
+                        <a:spcAft>
+                          <a:spcPts val="0"/>
+                        </a:spcAft>
+                        <a:buClrTx/>
+                        <a:buSzTx/>
+                        <a:buFontTx/>
+                        <a:buNone/>
+                        <a:tabLst/>
+                        <a:defRPr/>
+                      </a:pPr>
+                      <a:r>
+                        <a:rPr lang="fr-FR" sz="1100" kern="1200" dirty="0"/>
+                        <a:t>0.00</a:t>
+                      </a:r>
+                      <a:endParaRPr lang="fr-FR" sz="1100" kern="1200" dirty="0">
+                        <a:solidFill>
+                          <a:schemeClr val="dk1"/>
+                        </a:solidFill>
+                        <a:latin typeface="+mn-lt"/>
+                        <a:ea typeface="+mn-ea"/>
+                        <a:cs typeface="+mn-cs"/>
+                      </a:endParaRPr>
+                    </a:p>
+                  </a:txBody>
+                  <a:tcPr marL="68580" marR="68580" marT="0" marB="0" anchor="ctr"/>
+                </a:tc>
+                <a:tc>
+                  <a:txBody>
+                    <a:bodyPr/>
+                    <a:lstStyle/>
+                    <a:p>
+                      <a:pPr algn="ctr">
+                        <a:lnSpc>
+                          <a:spcPct val="115000"/>
+                        </a:lnSpc>
+                        <a:spcAft>
+                          <a:spcPts val="0"/>
+                        </a:spcAft>
+                      </a:pPr>
+                      <a:r>
+                        <a:rPr lang="fr-FR" sz="1100" kern="1200" dirty="0"/>
+                        <a:t>0.00</a:t>
+                      </a:r>
+                      <a:endParaRPr lang="en-IN" sz="1100" dirty="0">
+                        <a:solidFill>
+                          <a:srgbClr val="365F91"/>
+                        </a:solidFill>
+                        <a:effectLst/>
+                        <a:latin typeface="Calibri"/>
+                        <a:ea typeface="Calibri"/>
+                        <a:cs typeface="Times New Roman"/>
+                      </a:endParaRPr>
+                    </a:p>
+                  </a:txBody>
+                  <a:tcPr marL="68580" marR="68580" marT="0" marB="0" anchor="ctr"/>
+                </a:tc>
+                <a:tc>
+                  <a:txBody>
+                    <a:bodyPr/>
+                    <a:lstStyle/>
+                    <a:p>
+                      <a:pPr algn="ctr">
+                        <a:lnSpc>
+                          <a:spcPct val="115000"/>
+                        </a:lnSpc>
+                        <a:spcAft>
+                          <a:spcPts val="0"/>
+                        </a:spcAft>
+                      </a:pPr>
+                      <a:r>
+                        <a:rPr lang="en-US" sz="1100" dirty="0">
+                          <a:effectLst/>
+                        </a:rPr>
+                        <a:t>Good</a:t>
+                      </a:r>
+                      <a:endParaRPr lang="en-IN" sz="1100" dirty="0">
+                        <a:solidFill>
+                          <a:schemeClr val="tx1"/>
+                        </a:solidFill>
+                        <a:effectLst/>
+                        <a:latin typeface="Calibri"/>
+                        <a:ea typeface="Calibri"/>
+                        <a:cs typeface="Times New Roman"/>
+                      </a:endParaRPr>
+                    </a:p>
+                  </a:txBody>
+                  <a:tcPr marL="68580" marR="68580" marT="0" marB="0" anchor="ctr"/>
+                </a:tc>
+                <a:extLst>
+                  <a:ext uri="{0D108BD9-81ED-4DB2-BD59-A6C34878D82A}">
+                    <a16:rowId xmlns:a16="http://schemas.microsoft.com/office/drawing/2014/main" val="10001"/>
+                  </a:ext>
+                </a:extLst>
+              </a:tr>
+              <a:tr h="276729">
+                <a:tc>
+                  <a:txBody>
+                    <a:bodyPr/>
+                    <a:lstStyle/>
+                    <a:p>
+                      <a:pPr marL="0" marR="0" lvl="0" indent="0" algn="l" defTabSz="914400" rtl="0" eaLnBrk="1" fontAlgn="auto" latinLnBrk="0" hangingPunct="1">
+                        <a:lnSpc>
+                          <a:spcPct val="115000"/>
+                        </a:lnSpc>
+                        <a:spcBef>
+                          <a:spcPts val="0"/>
+                        </a:spcBef>
+                        <a:spcAft>
+                          <a:spcPts val="0"/>
+                        </a:spcAft>
+                        <a:buClrTx/>
+                        <a:buSzTx/>
+                        <a:buFontTx/>
+                        <a:buNone/>
+                        <a:tabLst/>
+                        <a:defRPr/>
+                      </a:pPr>
+                      <a:r>
+                        <a:rPr lang="en-US" sz="1100" dirty="0">
+                          <a:effectLst/>
+                        </a:rPr>
+                        <a:t>Efficiency - Expensive Calls in Loops</a:t>
+                      </a:r>
+                      <a:endParaRPr lang="en-IN" sz="1100" dirty="0">
+                        <a:solidFill>
+                          <a:srgbClr val="365F91"/>
+                        </a:solidFill>
+                        <a:effectLst/>
+                        <a:latin typeface="Calibri"/>
+                        <a:ea typeface="Calibri"/>
+                        <a:cs typeface="Times New Roman"/>
+                      </a:endParaRPr>
+                    </a:p>
+                  </a:txBody>
+                  <a:tcPr marL="68580" marR="68580" marT="0" marB="0" anchor="ctr"/>
+                </a:tc>
+                <a:tc>
+                  <a:txBody>
+                    <a:bodyPr/>
+                    <a:lstStyle/>
+                    <a:p>
+                      <a:pPr algn="ctr">
+                        <a:lnSpc>
+                          <a:spcPct val="115000"/>
+                        </a:lnSpc>
+                        <a:spcAft>
+                          <a:spcPts val="0"/>
+                        </a:spcAft>
+                      </a:pPr>
+                      <a:r>
+                        <a:rPr lang="fr-FR" sz="1100" kern="1200" dirty="0"/>
+                        <a:t>0.00</a:t>
+                      </a:r>
+                      <a:endParaRPr lang="en-IN" sz="1100" dirty="0">
+                        <a:solidFill>
+                          <a:srgbClr val="365F91"/>
+                        </a:solidFill>
+                        <a:effectLst/>
+                        <a:latin typeface="Calibri"/>
+                        <a:ea typeface="Calibri"/>
+                        <a:cs typeface="Times New Roman"/>
+                      </a:endParaRPr>
+                    </a:p>
+                  </a:txBody>
+                  <a:tcPr marL="68580" marR="68580" marT="0" marB="0" anchor="ctr"/>
+                </a:tc>
+                <a:tc>
+                  <a:txBody>
+                    <a:bodyPr/>
+                    <a:lstStyle/>
+                    <a:p>
+                      <a:pPr marL="0" marR="0" indent="0" algn="ctr" defTabSz="914400" rtl="0" eaLnBrk="1" fontAlgn="auto" latinLnBrk="0" hangingPunct="1">
+                        <a:lnSpc>
+                          <a:spcPct val="115000"/>
+                        </a:lnSpc>
+                        <a:spcBef>
+                          <a:spcPts val="0"/>
+                        </a:spcBef>
+                        <a:spcAft>
+                          <a:spcPts val="0"/>
+                        </a:spcAft>
+                        <a:buClrTx/>
+                        <a:buSzTx/>
+                        <a:buFontTx/>
+                        <a:buNone/>
+                        <a:tabLst/>
+                        <a:defRPr/>
+                      </a:pPr>
+                      <a:r>
+                        <a:rPr lang="fr-FR" sz="1100" kern="1200" dirty="0"/>
+                        <a:t>0.00</a:t>
+                      </a:r>
+                      <a:endParaRPr lang="fr-FR" sz="1100" kern="1200" dirty="0">
+                        <a:solidFill>
+                          <a:schemeClr val="dk1"/>
+                        </a:solidFill>
+                        <a:latin typeface="+mn-lt"/>
+                        <a:ea typeface="+mn-ea"/>
+                        <a:cs typeface="+mn-cs"/>
+                      </a:endParaRPr>
+                    </a:p>
+                  </a:txBody>
+                  <a:tcPr marL="68580" marR="68580" marT="0" marB="0" anchor="ctr"/>
+                </a:tc>
+                <a:tc>
+                  <a:txBody>
+                    <a:bodyPr/>
+                    <a:lstStyle/>
+                    <a:p>
+                      <a:pPr algn="ctr">
+                        <a:lnSpc>
+                          <a:spcPct val="115000"/>
+                        </a:lnSpc>
+                        <a:spcAft>
+                          <a:spcPts val="0"/>
+                        </a:spcAft>
+                      </a:pPr>
+                      <a:r>
+                        <a:rPr lang="fr-FR" sz="1100" kern="1200" dirty="0"/>
+                        <a:t>0.00</a:t>
+                      </a:r>
+                      <a:endParaRPr lang="en-IN" sz="1100" dirty="0">
+                        <a:solidFill>
+                          <a:srgbClr val="365F91"/>
+                        </a:solidFill>
+                        <a:effectLst/>
+                        <a:latin typeface="Calibri"/>
+                        <a:ea typeface="Calibri"/>
+                        <a:cs typeface="Times New Roman"/>
+                      </a:endParaRPr>
+                    </a:p>
+                  </a:txBody>
+                  <a:tcPr marL="68580" marR="68580" marT="0" marB="0" anchor="ctr"/>
+                </a:tc>
+                <a:tc>
+                  <a:txBody>
+                    <a:bodyPr/>
+                    <a:lstStyle/>
+                    <a:p>
+                      <a:pPr marL="0" marR="0" indent="0" algn="ctr" defTabSz="914400" rtl="0" eaLnBrk="1" fontAlgn="auto" latinLnBrk="0" hangingPunct="1">
+                        <a:lnSpc>
+                          <a:spcPct val="115000"/>
+                        </a:lnSpc>
+                        <a:spcBef>
+                          <a:spcPts val="0"/>
+                        </a:spcBef>
+                        <a:spcAft>
+                          <a:spcPts val="0"/>
+                        </a:spcAft>
+                        <a:buClrTx/>
+                        <a:buSzTx/>
+                        <a:buFontTx/>
+                        <a:buNone/>
+                        <a:tabLst/>
+                        <a:defRPr/>
+                      </a:pPr>
+                      <a:r>
+                        <a:rPr lang="en-US" sz="1100" dirty="0">
+                          <a:effectLst/>
+                        </a:rPr>
+                        <a:t>Good</a:t>
+                      </a:r>
+                      <a:endParaRPr lang="en-IN" sz="1100" dirty="0">
+                        <a:solidFill>
+                          <a:schemeClr val="tx1"/>
+                        </a:solidFill>
+                        <a:effectLst/>
+                        <a:latin typeface="+mn-lt"/>
+                        <a:ea typeface="Calibri"/>
+                        <a:cs typeface="Times New Roman"/>
+                      </a:endParaRPr>
+                    </a:p>
+                  </a:txBody>
+                  <a:tcPr marL="68580" marR="68580" marT="0" marB="0" anchor="ctr"/>
+                </a:tc>
+                <a:extLst>
+                  <a:ext uri="{0D108BD9-81ED-4DB2-BD59-A6C34878D82A}">
+                    <a16:rowId xmlns:a16="http://schemas.microsoft.com/office/drawing/2014/main" val="10002"/>
+                  </a:ext>
+                </a:extLst>
+              </a:tr>
+              <a:tr h="276729">
+                <a:tc>
+                  <a:txBody>
+                    <a:bodyPr/>
+                    <a:lstStyle/>
+                    <a:p>
+                      <a:pPr marL="0" marR="0" lvl="0" indent="0" algn="l" defTabSz="914400" rtl="0" eaLnBrk="1" fontAlgn="auto" latinLnBrk="0" hangingPunct="1">
+                        <a:lnSpc>
+                          <a:spcPct val="115000"/>
+                        </a:lnSpc>
+                        <a:spcBef>
+                          <a:spcPts val="0"/>
+                        </a:spcBef>
+                        <a:spcAft>
+                          <a:spcPts val="0"/>
+                        </a:spcAft>
+                        <a:buClrTx/>
+                        <a:buSzTx/>
+                        <a:buFontTx/>
+                        <a:buNone/>
+                        <a:tabLst/>
+                        <a:defRPr/>
+                      </a:pPr>
+                      <a:r>
+                        <a:rPr lang="en-US" sz="1100" dirty="0">
+                          <a:effectLst/>
+                        </a:rPr>
+                        <a:t>Avoid large Classes - too many Methods (JEE) (4554)</a:t>
+                      </a:r>
+                      <a:endParaRPr lang="en-IN" sz="1100" dirty="0">
+                        <a:solidFill>
+                          <a:srgbClr val="365F91"/>
+                        </a:solidFill>
+                        <a:effectLst/>
+                        <a:latin typeface="Calibri"/>
+                        <a:ea typeface="Calibri"/>
+                        <a:cs typeface="Times New Roman"/>
+                      </a:endParaRPr>
+                    </a:p>
+                  </a:txBody>
+                  <a:tcPr marL="68580" marR="68580" marT="0" marB="0" anchor="ctr"/>
+                </a:tc>
+                <a:tc>
+                  <a:txBody>
+                    <a:bodyPr/>
+                    <a:lstStyle/>
+                    <a:p>
+                      <a:pPr algn="ctr">
+                        <a:lnSpc>
+                          <a:spcPct val="115000"/>
+                        </a:lnSpc>
+                        <a:spcAft>
+                          <a:spcPts val="0"/>
+                        </a:spcAft>
+                      </a:pPr>
+                      <a:r>
+                        <a:rPr lang="fr-FR" sz="1100" kern="1200" dirty="0"/>
+                        <a:t>0.00</a:t>
+                      </a:r>
+                      <a:endParaRPr lang="en-IN" sz="1100" dirty="0">
+                        <a:solidFill>
+                          <a:srgbClr val="365F91"/>
+                        </a:solidFill>
+                        <a:effectLst/>
+                        <a:latin typeface="Calibri"/>
+                        <a:ea typeface="Calibri"/>
+                        <a:cs typeface="Times New Roman"/>
+                      </a:endParaRPr>
+                    </a:p>
+                  </a:txBody>
+                  <a:tcPr marL="68580" marR="68580" marT="0" marB="0" anchor="ctr"/>
+                </a:tc>
+                <a:tc>
+                  <a:txBody>
+                    <a:bodyPr/>
+                    <a:lstStyle/>
+                    <a:p>
+                      <a:pPr marL="0" marR="0" indent="0" algn="ctr" defTabSz="914400" rtl="0" eaLnBrk="1" fontAlgn="auto" latinLnBrk="0" hangingPunct="1">
+                        <a:lnSpc>
+                          <a:spcPct val="115000"/>
+                        </a:lnSpc>
+                        <a:spcBef>
+                          <a:spcPts val="0"/>
+                        </a:spcBef>
+                        <a:spcAft>
+                          <a:spcPts val="0"/>
+                        </a:spcAft>
+                        <a:buClrTx/>
+                        <a:buSzTx/>
+                        <a:buFontTx/>
+                        <a:buNone/>
+                        <a:tabLst/>
+                        <a:defRPr/>
+                      </a:pPr>
+                      <a:r>
+                        <a:rPr lang="fr-FR" sz="1100" kern="1200" dirty="0"/>
+                        <a:t>0.00</a:t>
+                      </a:r>
+                      <a:endParaRPr lang="en-IN" sz="1100" dirty="0">
+                        <a:solidFill>
+                          <a:srgbClr val="365F91"/>
+                        </a:solidFill>
+                        <a:effectLst/>
+                        <a:latin typeface="+mn-lt"/>
+                        <a:ea typeface="Calibri"/>
+                        <a:cs typeface="Times New Roman"/>
+                      </a:endParaRPr>
+                    </a:p>
+                  </a:txBody>
+                  <a:tcPr marL="68580" marR="68580" marT="0" marB="0" anchor="ctr"/>
+                </a:tc>
+                <a:tc>
+                  <a:txBody>
+                    <a:bodyPr/>
+                    <a:lstStyle/>
+                    <a:p>
+                      <a:pPr algn="ctr">
+                        <a:lnSpc>
+                          <a:spcPct val="115000"/>
+                        </a:lnSpc>
+                        <a:spcAft>
+                          <a:spcPts val="0"/>
+                        </a:spcAft>
+                      </a:pPr>
+                      <a:r>
+                        <a:rPr lang="fr-FR" sz="1100" kern="1200" dirty="0"/>
+                        <a:t>0.00</a:t>
+                      </a:r>
+                      <a:endParaRPr lang="en-IN" sz="1100" dirty="0">
+                        <a:solidFill>
+                          <a:srgbClr val="365F91"/>
+                        </a:solidFill>
+                        <a:effectLst/>
+                        <a:latin typeface="Calibri"/>
+                        <a:ea typeface="Calibri"/>
+                        <a:cs typeface="Times New Roman"/>
+                      </a:endParaRPr>
+                    </a:p>
+                  </a:txBody>
+                  <a:tcPr marL="68580" marR="68580" marT="0" marB="0" anchor="ctr"/>
+                </a:tc>
+                <a:tc>
+                  <a:txBody>
+                    <a:bodyPr/>
+                    <a:lstStyle/>
+                    <a:p>
+                      <a:pPr marL="0" marR="0" indent="0" algn="ctr" defTabSz="914400" rtl="0" eaLnBrk="1" fontAlgn="auto" latinLnBrk="0" hangingPunct="1">
+                        <a:lnSpc>
+                          <a:spcPct val="115000"/>
+                        </a:lnSpc>
+                        <a:spcBef>
+                          <a:spcPts val="0"/>
+                        </a:spcBef>
+                        <a:spcAft>
+                          <a:spcPts val="0"/>
+                        </a:spcAft>
+                        <a:buClrTx/>
+                        <a:buSzTx/>
+                        <a:buFontTx/>
+                        <a:buNone/>
+                        <a:tabLst/>
+                        <a:defRPr/>
+                      </a:pPr>
+                      <a:r>
+                        <a:rPr lang="en-US" sz="1100" dirty="0">
+                          <a:effectLst/>
+                        </a:rPr>
+                        <a:t>Good</a:t>
+                      </a:r>
+                      <a:endParaRPr lang="en-IN" sz="1100" dirty="0">
+                        <a:solidFill>
+                          <a:schemeClr val="tx1"/>
+                        </a:solidFill>
+                        <a:effectLst/>
+                        <a:latin typeface="+mn-lt"/>
+                        <a:ea typeface="Calibri"/>
+                        <a:cs typeface="Times New Roman"/>
+                      </a:endParaRPr>
+                    </a:p>
+                  </a:txBody>
+                  <a:tcPr marL="68580" marR="68580" marT="0" marB="0" anchor="ctr"/>
+                </a:tc>
+                <a:extLst>
+                  <a:ext uri="{0D108BD9-81ED-4DB2-BD59-A6C34878D82A}">
+                    <a16:rowId xmlns:a16="http://schemas.microsoft.com/office/drawing/2014/main" val="10003"/>
+                  </a:ext>
+                </a:extLst>
+              </a:tr>
+              <a:tr h="276729">
+                <a:tc>
+                  <a:txBody>
+                    <a:bodyPr/>
+                    <a:lstStyle/>
+                    <a:p>
+                      <a:pPr marL="0" marR="0" lvl="0" indent="0" algn="l" defTabSz="914400" rtl="0" eaLnBrk="1" fontAlgn="auto" latinLnBrk="0" hangingPunct="1">
+                        <a:lnSpc>
+                          <a:spcPct val="115000"/>
+                        </a:lnSpc>
+                        <a:spcBef>
+                          <a:spcPts val="0"/>
+                        </a:spcBef>
+                        <a:spcAft>
+                          <a:spcPts val="0"/>
+                        </a:spcAft>
+                        <a:buClrTx/>
+                        <a:buSzTx/>
+                        <a:buFontTx/>
+                        <a:buNone/>
+                        <a:tabLst/>
+                        <a:defRPr/>
+                      </a:pPr>
+                      <a:r>
+                        <a:rPr lang="en-US" sz="1100" dirty="0">
+                          <a:effectLst/>
+                        </a:rPr>
+                        <a:t>Avoid Classes with a very low comment/code ratio (7780)</a:t>
+                      </a:r>
+                      <a:endParaRPr lang="en-IN" sz="1100" dirty="0">
+                        <a:solidFill>
+                          <a:srgbClr val="365F91"/>
+                        </a:solidFill>
+                        <a:effectLst/>
+                        <a:latin typeface="Calibri"/>
+                        <a:ea typeface="Calibri"/>
+                        <a:cs typeface="Times New Roman"/>
+                      </a:endParaRPr>
+                    </a:p>
+                  </a:txBody>
+                  <a:tcPr marL="68580" marR="68580" marT="0" marB="0" anchor="ctr"/>
+                </a:tc>
+                <a:tc>
+                  <a:txBody>
+                    <a:bodyPr/>
+                    <a:lstStyle/>
+                    <a:p>
+                      <a:pPr algn="ctr">
+                        <a:lnSpc>
+                          <a:spcPct val="115000"/>
+                        </a:lnSpc>
+                        <a:spcAft>
+                          <a:spcPts val="0"/>
+                        </a:spcAft>
+                      </a:pPr>
+                      <a:r>
+                        <a:rPr lang="fr-FR" sz="1100" kern="1200" dirty="0"/>
+                        <a:t>0.00</a:t>
+                      </a:r>
+                      <a:endParaRPr lang="en-IN" sz="1100" dirty="0">
+                        <a:solidFill>
+                          <a:srgbClr val="365F91"/>
+                        </a:solidFill>
+                        <a:effectLst/>
+                        <a:latin typeface="Calibri"/>
+                        <a:ea typeface="Calibri"/>
+                        <a:cs typeface="Times New Roman"/>
+                      </a:endParaRPr>
+                    </a:p>
+                  </a:txBody>
+                  <a:tcPr marL="68580" marR="68580" marT="0" marB="0" anchor="ctr"/>
+                </a:tc>
+                <a:tc>
+                  <a:txBody>
+                    <a:bodyPr/>
+                    <a:lstStyle/>
+                    <a:p>
+                      <a:pPr marL="0" marR="0" indent="0" algn="ctr" defTabSz="914400" rtl="0" eaLnBrk="1" fontAlgn="auto" latinLnBrk="0" hangingPunct="1">
+                        <a:lnSpc>
+                          <a:spcPct val="115000"/>
+                        </a:lnSpc>
+                        <a:spcBef>
+                          <a:spcPts val="0"/>
+                        </a:spcBef>
+                        <a:spcAft>
+                          <a:spcPts val="0"/>
+                        </a:spcAft>
+                        <a:buClrTx/>
+                        <a:buSzTx/>
+                        <a:buFontTx/>
+                        <a:buNone/>
+                        <a:tabLst/>
+                        <a:defRPr/>
+                      </a:pPr>
+                      <a:r>
+                        <a:rPr lang="fr-FR" sz="1100" kern="1200" dirty="0"/>
+                        <a:t>0.00</a:t>
+                      </a:r>
+                      <a:endParaRPr lang="en-IN" sz="1100" dirty="0">
+                        <a:solidFill>
+                          <a:srgbClr val="365F91"/>
+                        </a:solidFill>
+                        <a:effectLst/>
+                        <a:latin typeface="+mn-lt"/>
+                        <a:ea typeface="Calibri"/>
+                        <a:cs typeface="Times New Roman"/>
+                      </a:endParaRPr>
+                    </a:p>
+                  </a:txBody>
+                  <a:tcPr marL="68580" marR="68580" marT="0" marB="0" anchor="ctr"/>
+                </a:tc>
+                <a:tc>
+                  <a:txBody>
+                    <a:bodyPr/>
+                    <a:lstStyle/>
+                    <a:p>
+                      <a:pPr algn="ctr">
+                        <a:lnSpc>
+                          <a:spcPct val="115000"/>
+                        </a:lnSpc>
+                        <a:spcAft>
+                          <a:spcPts val="0"/>
+                        </a:spcAft>
+                      </a:pPr>
+                      <a:r>
+                        <a:rPr lang="fr-FR" sz="1100" kern="1200" dirty="0"/>
+                        <a:t>0.00</a:t>
+                      </a:r>
+                      <a:endParaRPr lang="en-IN" sz="1100" dirty="0">
+                        <a:solidFill>
+                          <a:srgbClr val="365F91"/>
+                        </a:solidFill>
+                        <a:effectLst/>
+                        <a:latin typeface="Calibri"/>
+                        <a:ea typeface="Calibri"/>
+                        <a:cs typeface="Times New Roman"/>
+                      </a:endParaRPr>
+                    </a:p>
+                  </a:txBody>
+                  <a:tcPr marL="68580" marR="68580" marT="0" marB="0" anchor="ctr"/>
+                </a:tc>
+                <a:tc>
+                  <a:txBody>
+                    <a:bodyPr/>
+                    <a:lstStyle/>
+                    <a:p>
+                      <a:pPr marL="0" marR="0" indent="0" algn="ctr" defTabSz="914400" rtl="0" eaLnBrk="1" fontAlgn="auto" latinLnBrk="0" hangingPunct="1">
+                        <a:lnSpc>
+                          <a:spcPct val="115000"/>
+                        </a:lnSpc>
+                        <a:spcBef>
+                          <a:spcPts val="0"/>
+                        </a:spcBef>
+                        <a:spcAft>
+                          <a:spcPts val="0"/>
+                        </a:spcAft>
+                        <a:buClrTx/>
+                        <a:buSzTx/>
+                        <a:buFontTx/>
+                        <a:buNone/>
+                        <a:tabLst/>
+                        <a:defRPr/>
+                      </a:pPr>
+                      <a:r>
+                        <a:rPr lang="en-US" sz="1100" dirty="0">
+                          <a:effectLst/>
+                        </a:rPr>
+                        <a:t>Good</a:t>
+                      </a:r>
+                      <a:endParaRPr lang="en-IN" sz="1100" dirty="0">
+                        <a:solidFill>
+                          <a:schemeClr val="tx1"/>
+                        </a:solidFill>
+                        <a:effectLst/>
+                        <a:latin typeface="+mn-lt"/>
+                        <a:ea typeface="Calibri"/>
+                        <a:cs typeface="Times New Roman"/>
+                      </a:endParaRPr>
+                    </a:p>
+                  </a:txBody>
+                  <a:tcPr marL="68580" marR="68580" marT="0" marB="0" anchor="ctr"/>
+                </a:tc>
+                <a:extLst>
+                  <a:ext uri="{0D108BD9-81ED-4DB2-BD59-A6C34878D82A}">
+                    <a16:rowId xmlns:a16="http://schemas.microsoft.com/office/drawing/2014/main" val="2379241525"/>
+                  </a:ext>
+                </a:extLst>
+              </a:tr>
+            </a:tbl>
+          </a:graphicData>
+        </a:graphic>
+      </p:graphicFrame>
+      <p:sp>
+        <p:nvSpPr>
+          <p:cNvPr id="19" name="TextBox 18"/>
+          <p:cNvSpPr txBox="1"/>
+          <p:nvPr/>
+        </p:nvSpPr>
+        <p:spPr>
+          <a:xfrm>
+            <a:off x="1239152" y="2708920"/>
+            <a:ext cx="800219" cy="369332"/>
+          </a:xfrm>
+          <a:prstGeom prst="rect">
+            <a:avLst/>
+          </a:prstGeom>
+          <a:noFill/>
+        </p:spPr>
+        <p:txBody>
+          <a:bodyPr wrap="none" rtlCol="0">
+            <a:spAutoFit/>
+          </a:bodyPr>
+          <a:lstStyle>
+            <a:defPPr>
+              <a:defRPr lang="fr-FR"/>
+            </a:defPPr>
+            <a:lvl1pPr algn="r">
+              <a:defRPr sz="2000">
+                <a:solidFill>
+                  <a:schemeClr val="bg1">
+                    <a:lumMod val="50000"/>
+                  </a:schemeClr>
+                </a:solidFill>
+              </a:defRPr>
+            </a:lvl1pPr>
+          </a:lstStyle>
+          <a:p>
+            <a:r>
+              <a:rPr lang="en-US" sz="1800" dirty="0"/>
+              <a:t>Note :</a:t>
+            </a:r>
+          </a:p>
+        </p:txBody>
+      </p:sp>
+      <p:sp>
+        <p:nvSpPr>
+          <p:cNvPr id="18" name="Rectangle 17"/>
+          <p:cNvSpPr/>
+          <p:nvPr/>
+        </p:nvSpPr>
+        <p:spPr>
+          <a:xfrm>
+            <a:off x="1943741" y="2777512"/>
+            <a:ext cx="6702476" cy="1785104"/>
+          </a:xfrm>
+          <a:prstGeom prst="rect">
+            <a:avLst/>
+          </a:prstGeom>
+          <a:noFill/>
+        </p:spPr>
+        <p:txBody>
+          <a:bodyPr wrap="none" rtlCol="0">
+            <a:spAutoFit/>
+          </a:bodyPr>
+          <a:lstStyle/>
+          <a:p>
+            <a:r>
+              <a:rPr lang="en-US" sz="1100" b="1" dirty="0">
+                <a:solidFill>
+                  <a:schemeClr val="bg1">
+                    <a:lumMod val="50000"/>
+                  </a:schemeClr>
+                </a:solidFill>
+              </a:rPr>
+              <a:t>-SLA Assessment thresholds</a:t>
+            </a:r>
+          </a:p>
+          <a:p>
+            <a:pPr lvl="1"/>
+            <a:r>
+              <a:rPr lang="en-US" sz="1100" dirty="0">
+                <a:solidFill>
+                  <a:schemeClr val="bg1">
+                    <a:lumMod val="50000"/>
+                  </a:schemeClr>
+                </a:solidFill>
+              </a:rPr>
+              <a:t>Good if % difference between Target and Actual is less than a%</a:t>
+            </a:r>
+          </a:p>
+          <a:p>
+            <a:pPr lvl="1"/>
+            <a:r>
+              <a:rPr lang="en-US" sz="1100" dirty="0">
+                <a:solidFill>
+                  <a:schemeClr val="bg1">
+                    <a:lumMod val="50000"/>
+                  </a:schemeClr>
+                </a:solidFill>
+              </a:rPr>
+              <a:t>Acceptable if &amp; difference between Target and Actual is between a% and b%</a:t>
+            </a:r>
+          </a:p>
+          <a:p>
+            <a:pPr lvl="1"/>
+            <a:r>
+              <a:rPr lang="en-US" sz="1100" dirty="0">
+                <a:solidFill>
+                  <a:schemeClr val="bg1">
+                    <a:lumMod val="50000"/>
+                  </a:schemeClr>
+                </a:solidFill>
+              </a:rPr>
+              <a:t>Poor if % difference between Target and Actual is greater </a:t>
+            </a:r>
+            <a:r>
+              <a:rPr lang="en-US" sz="1100">
+                <a:solidFill>
+                  <a:schemeClr val="bg1">
+                    <a:lumMod val="50000"/>
+                  </a:schemeClr>
+                </a:solidFill>
+              </a:rPr>
+              <a:t>than b%</a:t>
+            </a:r>
+            <a:endParaRPr lang="en-US" sz="1100" dirty="0">
+              <a:solidFill>
+                <a:schemeClr val="bg1">
+                  <a:lumMod val="50000"/>
+                </a:schemeClr>
+              </a:solidFill>
+            </a:endParaRPr>
+          </a:p>
+          <a:p>
+            <a:r>
+              <a:rPr lang="en-US" sz="1100" b="1" dirty="0">
+                <a:solidFill>
+                  <a:schemeClr val="bg1">
+                    <a:lumMod val="50000"/>
+                  </a:schemeClr>
+                </a:solidFill>
+              </a:rPr>
+              <a:t>-Actual score</a:t>
+            </a:r>
+            <a:r>
+              <a:rPr lang="en-US" sz="1100" dirty="0">
+                <a:solidFill>
+                  <a:schemeClr val="bg1">
+                    <a:lumMod val="50000"/>
+                  </a:schemeClr>
+                </a:solidFill>
+              </a:rPr>
+              <a:t>: for each app, score from latest snapshot (even if snapshot date is before current quarter), </a:t>
+            </a:r>
+            <a:br>
+              <a:rPr lang="en-US" sz="1100" dirty="0">
+                <a:solidFill>
+                  <a:schemeClr val="bg1">
+                    <a:lumMod val="50000"/>
+                  </a:schemeClr>
+                </a:solidFill>
+              </a:rPr>
+            </a:br>
+            <a:r>
+              <a:rPr lang="en-US" sz="1100" dirty="0">
+                <a:solidFill>
+                  <a:schemeClr val="bg1">
+                    <a:lumMod val="50000"/>
+                  </a:schemeClr>
+                </a:solidFill>
+              </a:rPr>
+              <a:t>then average for all apps</a:t>
+            </a:r>
+          </a:p>
+          <a:p>
+            <a:r>
+              <a:rPr lang="en-US" sz="1100" b="1" dirty="0">
+                <a:solidFill>
+                  <a:schemeClr val="bg1">
+                    <a:lumMod val="50000"/>
+                  </a:schemeClr>
+                </a:solidFill>
+              </a:rPr>
+              <a:t>-Target score</a:t>
+            </a:r>
+            <a:r>
+              <a:rPr lang="en-US" sz="1100" dirty="0">
+                <a:solidFill>
+                  <a:schemeClr val="bg1">
+                    <a:lumMod val="50000"/>
+                  </a:schemeClr>
+                </a:solidFill>
+              </a:rPr>
+              <a:t>: score to reach, to be configured as an option of the component. </a:t>
+            </a:r>
+          </a:p>
+          <a:p>
+            <a:r>
+              <a:rPr lang="en-US" sz="1100" b="1" dirty="0">
+                <a:solidFill>
+                  <a:schemeClr val="bg1">
+                    <a:lumMod val="50000"/>
+                  </a:schemeClr>
+                </a:solidFill>
+              </a:rPr>
+              <a:t>-Previous quarter</a:t>
+            </a:r>
+            <a:r>
+              <a:rPr lang="en-US" sz="1100" dirty="0">
+                <a:solidFill>
+                  <a:schemeClr val="bg1">
+                    <a:lumMod val="50000"/>
+                  </a:schemeClr>
+                </a:solidFill>
+              </a:rPr>
+              <a:t>: for each app, score from latest snapshot in previous quarter (even if snapshot date is </a:t>
+            </a:r>
+            <a:br>
+              <a:rPr lang="en-US" sz="1100" dirty="0">
+                <a:solidFill>
+                  <a:schemeClr val="bg1">
+                    <a:lumMod val="50000"/>
+                  </a:schemeClr>
+                </a:solidFill>
+              </a:rPr>
+            </a:br>
+            <a:r>
+              <a:rPr lang="en-US" sz="1100" dirty="0">
+                <a:solidFill>
+                  <a:schemeClr val="bg1">
+                    <a:lumMod val="50000"/>
+                  </a:schemeClr>
+                </a:solidFill>
+              </a:rPr>
+              <a:t>before previous quarter). then average for all apps</a:t>
+            </a:r>
+          </a:p>
+          <a:p>
+            <a:endParaRPr lang="en-US" sz="1100" dirty="0">
+              <a:solidFill>
+                <a:schemeClr val="bg1">
+                  <a:lumMod val="50000"/>
+                </a:schemeClr>
+              </a:solidFill>
+            </a:endParaRPr>
+          </a:p>
+        </p:txBody>
+      </p:sp>
+      <p:sp>
+        <p:nvSpPr>
+          <p:cNvPr id="2" name="TextBox 1">
+            <a:extLst>
+              <a:ext uri="{FF2B5EF4-FFF2-40B4-BE49-F238E27FC236}">
+                <a16:creationId xmlns:a16="http://schemas.microsoft.com/office/drawing/2014/main" id="{F912DBB0-DFAA-4F53-81AA-BCAA81737FD9}"/>
+              </a:ext>
+            </a:extLst>
+          </p:cNvPr>
+          <p:cNvSpPr txBox="1"/>
+          <p:nvPr/>
+        </p:nvSpPr>
+        <p:spPr>
+          <a:xfrm>
+            <a:off x="7414121" y="1027185"/>
+            <a:ext cx="864096" cy="461665"/>
+          </a:xfrm>
+          <a:prstGeom prst="rect">
+            <a:avLst/>
+          </a:prstGeom>
+        </p:spPr>
+        <p:txBody>
+          <a:bodyPr vert="horz" wrap="square" lIns="45720" tIns="45720" rIns="45720" bIns="45720" rtlCol="0">
+            <a:spAutoFit/>
+          </a:bodyPr>
+          <a:lstStyle/>
+          <a:p>
+            <a:pPr marL="1587">
+              <a:spcBef>
+                <a:spcPts val="300"/>
+              </a:spcBef>
+              <a:spcAft>
+                <a:spcPts val="400"/>
+              </a:spcAft>
+              <a:buClr>
+                <a:schemeClr val="tx2">
+                  <a:lumMod val="65000"/>
+                  <a:lumOff val="35000"/>
+                </a:schemeClr>
+              </a:buClr>
+              <a:buSzPct val="95000"/>
+            </a:pPr>
+            <a:r>
+              <a:rPr lang="en-US" sz="2400" b="1" dirty="0">
+                <a:solidFill>
+                  <a:srgbClr val="FF0000"/>
+                </a:solidFill>
+                <a:latin typeface="+mn-lt"/>
+                <a:cs typeface="Arial" pitchFamily="34" charset="0"/>
+              </a:rPr>
+              <a:t>NEW</a:t>
+            </a:r>
+          </a:p>
+        </p:txBody>
+      </p:sp>
+    </p:spTree>
+    <p:extLst>
+      <p:ext uri="{BB962C8B-B14F-4D97-AF65-F5344CB8AC3E}">
+        <p14:creationId xmlns:p14="http://schemas.microsoft.com/office/powerpoint/2010/main" val="49455635"/>
+      </p:ext>
+    </p:extLst>
+  </p:cSld>
+  <p:clrMapOvr>
+    <a:masterClrMapping/>
+  </p:clrMapOvr>
+</p:sld>
+</file>
+
+<file path=ppt/slides/slide25.xml><?xml version="1.0" encoding="utf-8"?>
 <p:sld xmlns:a="http://schemas.openxmlformats.org/drawingml/2006/main" xmlns:r="http://schemas.openxmlformats.org/officeDocument/2006/relationships" xmlns:p="http://schemas.openxmlformats.org/presentationml/2006/main">
   <p:cSld>
     <p:spTree>
@@ -29923,7 +31534,7 @@
 </p:sld>
 </file>
 
-<file path=ppt/slides/slide25.xml><?xml version="1.0" encoding="utf-8"?>
+<file path=ppt/slides/slide26.xml><?xml version="1.0" encoding="utf-8"?>
 <p:sld xmlns:a="http://schemas.openxmlformats.org/drawingml/2006/main" xmlns:r="http://schemas.openxmlformats.org/officeDocument/2006/relationships" xmlns:p="http://schemas.openxmlformats.org/presentationml/2006/main">
   <p:cSld>
     <p:spTree>
@@ -29974,7 +31585,7 @@
                   <a:prstClr val="black"/>
                 </a:buClr>
               </a:pPr>
-              <a:t>25</a:t>
+              <a:t>26</a:t>
             </a:fld>
             <a:endParaRPr lang="en-US" dirty="0">
               <a:solidFill>

</xml_diff>

<commit_message>
REPORTGEN-914: update chinese library templates
</commit_message>
<xml_diff>
--- a/CastReporting.Reporting.Core/Templates/zh-CN/Portfolio/Portfolio component library/1- Portfolio-Powerpoint-components-library.pptx
+++ b/CastReporting.Reporting.Core/Templates/zh-CN/Portfolio/Portfolio component library/1- Portfolio-Powerpoint-components-library.pptx
@@ -2181,7 +2181,7 @@
           <a:p>
             <a:fld id="{268042A1-6D91-4513-A62D-1E3FD70C84BE}" type="datetimeFigureOut">
               <a:rPr lang="fr-FR" smtClean="0"/>
-              <a:t>21/07/2020</a:t>
+              <a:t>03/08/2020</a:t>
             </a:fld>
             <a:endParaRPr lang="fr-FR"/>
           </a:p>
@@ -2779,7 +2779,7 @@
             <a:fld id="{D8E3BBD6-5DF7-411E-B793-6A3558CCCDCA}" type="datetimeFigureOut">
               <a:rPr lang="fr-FR" smtClean="0"/>
               <a:pPr/>
-              <a:t>21/07/2020</a:t>
+              <a:t>03/08/2020</a:t>
             </a:fld>
             <a:endParaRPr lang="fr-FR" dirty="0"/>
           </a:p>
@@ -2942,7 +2942,7 @@
             <a:fld id="{D8E3BBD6-5DF7-411E-B793-6A3558CCCDCA}" type="datetimeFigureOut">
               <a:rPr lang="fr-FR" smtClean="0"/>
               <a:pPr/>
-              <a:t>21/07/2020</a:t>
+              <a:t>03/08/2020</a:t>
             </a:fld>
             <a:endParaRPr lang="fr-FR" dirty="0"/>
           </a:p>
@@ -4447,7 +4447,7 @@
             <a:fld id="{D8E3BBD6-5DF7-411E-B793-6A3558CCCDCA}" type="datetimeFigureOut">
               <a:rPr lang="fr-FR" smtClean="0"/>
               <a:pPr/>
-              <a:t>21/07/2020</a:t>
+              <a:t>03/08/2020</a:t>
             </a:fld>
             <a:endParaRPr lang="fr-FR" dirty="0"/>
           </a:p>
@@ -6807,7 +6807,7 @@
             <a:fld id="{D8E3BBD6-5DF7-411E-B793-6A3558CCCDCA}" type="datetimeFigureOut">
               <a:rPr lang="fr-FR" smtClean="0"/>
               <a:pPr/>
-              <a:t>21/07/2020</a:t>
+              <a:t>03/08/2020</a:t>
             </a:fld>
             <a:endParaRPr lang="fr-FR" dirty="0"/>
           </a:p>
@@ -9433,7 +9433,7 @@
             <a:fld id="{D8E3BBD6-5DF7-411E-B793-6A3558CCCDCA}" type="datetimeFigureOut">
               <a:rPr lang="fr-FR" smtClean="0"/>
               <a:pPr/>
-              <a:t>21/07/2020</a:t>
+              <a:t>03/08/2020</a:t>
             </a:fld>
             <a:endParaRPr lang="fr-FR" dirty="0"/>
           </a:p>
@@ -12342,7 +12342,7 @@
             <a:fld id="{D8E3BBD6-5DF7-411E-B793-6A3558CCCDCA}" type="datetimeFigureOut">
               <a:rPr lang="fr-FR" smtClean="0"/>
               <a:pPr/>
-              <a:t>21/07/2020</a:t>
+              <a:t>03/08/2020</a:t>
             </a:fld>
             <a:endParaRPr lang="fr-FR" dirty="0"/>
           </a:p>
@@ -14126,7 +14126,7 @@
             <a:fld id="{D8E3BBD6-5DF7-411E-B793-6A3558CCCDCA}" type="datetimeFigureOut">
               <a:rPr lang="fr-FR" smtClean="0"/>
               <a:pPr/>
-              <a:t>21/07/2020</a:t>
+              <a:t>03/08/2020</a:t>
             </a:fld>
             <a:endParaRPr lang="fr-FR" dirty="0"/>
           </a:p>
@@ -14206,7 +14206,7 @@
             <a:fld id="{D8E3BBD6-5DF7-411E-B793-6A3558CCCDCA}" type="datetimeFigureOut">
               <a:rPr lang="fr-FR" smtClean="0"/>
               <a:pPr/>
-              <a:t>21/07/2020</a:t>
+              <a:t>03/08/2020</a:t>
             </a:fld>
             <a:endParaRPr lang="fr-FR" dirty="0"/>
           </a:p>
@@ -14466,7 +14466,7 @@
             <a:fld id="{D8E3BBD6-5DF7-411E-B793-6A3558CCCDCA}" type="datetimeFigureOut">
               <a:rPr lang="fr-FR" smtClean="0"/>
               <a:pPr/>
-              <a:t>21/07/2020</a:t>
+              <a:t>03/08/2020</a:t>
             </a:fld>
             <a:endParaRPr lang="fr-FR" dirty="0"/>
           </a:p>
@@ -14708,7 +14708,7 @@
             <a:fld id="{D8E3BBD6-5DF7-411E-B793-6A3558CCCDCA}" type="datetimeFigureOut">
               <a:rPr lang="fr-FR" smtClean="0"/>
               <a:pPr/>
-              <a:t>21/07/2020</a:t>
+              <a:t>03/08/2020</a:t>
             </a:fld>
             <a:endParaRPr lang="fr-FR" dirty="0"/>
           </a:p>
@@ -14910,7 +14910,7 @@
             <a:fld id="{D8E3BBD6-5DF7-411E-B793-6A3558CCCDCA}" type="datetimeFigureOut">
               <a:rPr lang="fr-FR" smtClean="0"/>
               <a:pPr/>
-              <a:t>21/07/2020</a:t>
+              <a:t>03/08/2020</a:t>
             </a:fld>
             <a:endParaRPr lang="fr-FR" dirty="0"/>
           </a:p>
@@ -22165,7 +22165,7 @@
           <a:p>
             <a:r>
               <a:rPr lang="en-US" sz="1100" dirty="0"/>
-              <a:t>- PARAMS=SZ a SZ b, (SZ pour sizing measure or category, QR pour quality rule, BF for background fact)</a:t>
+              <a:t>- PARAMS=SZ a SZ b, (SZ pour sizing measure, QR pour quality rule, BF for background fact)</a:t>
             </a:r>
           </a:p>
           <a:p>
@@ -22343,7 +22343,7 @@
         <p:spPr>
           <a:xfrm>
             <a:off x="1576290" y="3807332"/>
-            <a:ext cx="5760640" cy="2123658"/>
+            <a:ext cx="5760640" cy="1615827"/>
           </a:xfrm>
           <a:prstGeom prst="rect">
             <a:avLst/>
@@ -22443,16 +22443,6 @@
               <a:rPr lang="en-GB" sz="1100" dirty="0"/>
               <a:t>/!\ don’t put blank char in the definition of parameters (,a=67011,b=67010,c=…)</a:t>
             </a:r>
-          </a:p>
-          <a:p>
-            <a:endParaRPr lang="en-GB" sz="1100" dirty="0"/>
-          </a:p>
-          <a:p>
-            <a:r>
-              <a:rPr lang="en-US" sz="1100" dirty="0"/>
-              <a:t>You can put a category id instead of a sizing measure, for example 65104 for  very large size artifact.</a:t>
-            </a:r>
-            <a:endParaRPr lang="en-GB" sz="1100" dirty="0"/>
           </a:p>
         </p:txBody>
       </p:sp>

</xml_diff>